<commit_message>
Final Poster in pdf format
</commit_message>
<xml_diff>
--- a/Documenation/Poster template.pptx
+++ b/Documenation/Poster template.pptx
@@ -208,7 +208,7 @@
           <a:p>
             <a:fld id="{CF7263C8-1F4A-D143-B9CC-F49476357AC0}" type="datetimeFigureOut">
               <a:rPr lang="en-US" smtClean="0"/>
-              <a:t>4/18/2018</a:t>
+              <a:t>4/20/2018</a:t>
             </a:fld>
             <a:endParaRPr lang="en-US"/>
           </a:p>
@@ -2923,7 +2923,7 @@
           <a:p>
             <a:r>
               <a:rPr lang="en-US" sz="5500" b="1" dirty="0"/>
-              <a:t>3. &lt;Technical section&gt; </a:t>
+              <a:t>3.  Technical Details</a:t>
             </a:r>
           </a:p>
         </p:txBody>
@@ -3135,7 +3135,7 @@
             </a:pPr>
             <a:r>
               <a:rPr lang="en-US" sz="3333" dirty="0"/>
-              <a:t>Batch size = 32,</a:t>
+              <a:t>Batch size = 16,</a:t>
             </a:r>
           </a:p>
           <a:p>
@@ -3247,7 +3247,7 @@
         <p:spPr>
           <a:xfrm>
             <a:off x="10699740" y="6982344"/>
-            <a:ext cx="15232632" cy="3682611"/>
+            <a:ext cx="15232632" cy="5734198"/>
           </a:xfrm>
           <a:prstGeom prst="rect">
             <a:avLst/>
@@ -3260,90 +3260,61 @@
           </a:bodyPr>
           <a:lstStyle/>
           <a:p>
-            <a:pPr marL="952462" indent="-952462">
-              <a:buFont typeface="Arial" charset="0"/>
-              <a:buChar char="•"/>
-            </a:pPr>
-            <a:r>
-              <a:rPr lang="en-US" sz="3333" dirty="0">
-                <a:highlight>
-                  <a:srgbClr val="FFFF00"/>
-                </a:highlight>
-              </a:rPr>
-              <a:t>CNNs make the assumption that inputs are images.</a:t>
-            </a:r>
-          </a:p>
-          <a:p>
-            <a:pPr marL="952462" indent="-952462">
-              <a:buFont typeface="Arial" charset="0"/>
-              <a:buChar char="•"/>
-            </a:pPr>
-            <a:r>
-              <a:rPr lang="en-US" sz="3333" dirty="0">
-                <a:highlight>
-                  <a:srgbClr val="FFFF00"/>
-                </a:highlight>
-              </a:rPr>
-              <a:t>K-L divergence is a measure of distance between distributions. </a:t>
-            </a:r>
-          </a:p>
-          <a:p>
-            <a:pPr marL="952462" indent="-952462">
-              <a:buFont typeface="Arial" charset="0"/>
-              <a:buChar char="•"/>
-            </a:pPr>
-            <a:endParaRPr lang="en-US" sz="3333" dirty="0">
-              <a:highlight>
-                <a:srgbClr val="FFFF00"/>
-              </a:highlight>
-            </a:endParaRPr>
-          </a:p>
-          <a:p>
-            <a:pPr marL="952462" indent="-952462">
-              <a:buFont typeface="Arial" charset="0"/>
-              <a:buChar char="•"/>
-            </a:pPr>
-            <a:endParaRPr lang="en-US" sz="3333" dirty="0">
-              <a:highlight>
-                <a:srgbClr val="FFFF00"/>
-              </a:highlight>
-            </a:endParaRPr>
-          </a:p>
-          <a:p>
-            <a:r>
-              <a:rPr lang="en-US" sz="3333" dirty="0">
-                <a:highlight>
-                  <a:srgbClr val="FFFF00"/>
-                </a:highlight>
-              </a:rPr>
-              <a:t>&lt;Diagram for best performing model&gt;</a:t>
-            </a:r>
-          </a:p>
-          <a:p>
-            <a:r>
-              <a:rPr lang="en-US" sz="3333" dirty="0">
-                <a:highlight>
-                  <a:srgbClr val="FFFF00"/>
-                </a:highlight>
-              </a:rPr>
-              <a:t>Input image -&gt; Gaussian mixture model -&gt; </a:t>
-            </a:r>
-            <a:r>
-              <a:rPr lang="en-US" sz="3333" dirty="0" err="1">
-                <a:highlight>
-                  <a:srgbClr val="FFFF00"/>
-                </a:highlight>
-              </a:rPr>
-              <a:t>kNN</a:t>
-            </a:r>
-            <a:r>
-              <a:rPr lang="en-US" sz="3333" dirty="0">
-                <a:highlight>
-                  <a:srgbClr val="FFFF00"/>
-                </a:highlight>
-              </a:rPr>
-              <a:t> to GMM templates using K-L divergence.</a:t>
-            </a:r>
+            <a:r>
+              <a:rPr lang="en-US" sz="3333" dirty="0"/>
+              <a:t>The implementation is done in Python 2.7.</a:t>
+            </a:r>
+          </a:p>
+          <a:p>
+            <a:r>
+              <a:rPr lang="en-US" sz="3333" dirty="0"/>
+              <a:t>Division of the project is done into 2 modules:</a:t>
+            </a:r>
+          </a:p>
+          <a:p>
+            <a:r>
+              <a:rPr lang="en-US" sz="3333" dirty="0"/>
+              <a:t>	1.Preprocessing of the image.</a:t>
+            </a:r>
+          </a:p>
+          <a:p>
+            <a:r>
+              <a:rPr lang="en-US" sz="3333" dirty="0"/>
+              <a:t>		-Conversion of image to gray scale.</a:t>
+            </a:r>
+          </a:p>
+          <a:p>
+            <a:r>
+              <a:rPr lang="en-US" sz="3333" dirty="0"/>
+              <a:t>		-Edge detection</a:t>
+            </a:r>
+          </a:p>
+          <a:p>
+            <a:r>
+              <a:rPr lang="en-US" sz="3333" dirty="0"/>
+              <a:t>		-Segmentation</a:t>
+            </a:r>
+          </a:p>
+          <a:p>
+            <a:r>
+              <a:rPr lang="en-US" sz="3333" dirty="0"/>
+              <a:t>	2.Optical Character Recognition using ANN.</a:t>
+            </a:r>
+          </a:p>
+          <a:p>
+            <a:endParaRPr lang="en-US" sz="3333" dirty="0"/>
+          </a:p>
+          <a:p>
+            <a:r>
+              <a:rPr lang="en-US" sz="3333" dirty="0"/>
+              <a:t>	</a:t>
+            </a:r>
+          </a:p>
+          <a:p>
+            <a:endParaRPr lang="en-US" sz="3333" dirty="0"/>
+          </a:p>
+          <a:p>
+            <a:endParaRPr lang="en-US" sz="3333" dirty="0"/>
           </a:p>
         </p:txBody>
       </p:sp>
@@ -3356,7 +3327,7 @@
         <p:spPr>
           <a:xfrm>
             <a:off x="10699741" y="17181444"/>
-            <a:ext cx="15204575" cy="5734198"/>
+            <a:ext cx="15204575" cy="4195508"/>
           </a:xfrm>
           <a:prstGeom prst="rect">
             <a:avLst/>
@@ -3370,81 +3341,39 @@
           <a:lstStyle/>
           <a:p>
             <a:r>
-              <a:rPr lang="en-US" sz="3333" dirty="0">
-                <a:highlight>
-                  <a:srgbClr val="FFFF00"/>
-                </a:highlight>
-              </a:rPr>
-              <a:t>&lt;diagrams showing the results of your method&gt;</a:t>
-            </a:r>
-          </a:p>
-          <a:p>
-            <a:r>
-              <a:rPr lang="en-US" sz="3333" dirty="0">
-                <a:highlight>
-                  <a:srgbClr val="FFFF00"/>
-                </a:highlight>
-              </a:rPr>
-              <a:t>(For example,</a:t>
-            </a:r>
-          </a:p>
-          <a:p>
-            <a:pPr marL="714346" indent="-714346">
-              <a:buAutoNum type="romanLcParenBoth"/>
-            </a:pPr>
-            <a:r>
-              <a:rPr lang="en-US" sz="3333" dirty="0">
-                <a:highlight>
-                  <a:srgbClr val="FFFF00"/>
-                </a:highlight>
-              </a:rPr>
-              <a:t>For CNNs for classification, true positive, one false positive, one false negative. Learning curves for loss vs. number of iterations, training and testing accuracies vs. number of iterations.</a:t>
-            </a:r>
-          </a:p>
-          <a:p>
-            <a:pPr marL="714346" indent="-714346">
-              <a:buAutoNum type="romanLcParenBoth"/>
-            </a:pPr>
-            <a:r>
-              <a:rPr lang="en-US" sz="3333" dirty="0">
-                <a:highlight>
-                  <a:srgbClr val="FFFF00"/>
-                </a:highlight>
-              </a:rPr>
-              <a:t>For GMMs, a portion of the image (original and classified) that the method found hard to discriminate. </a:t>
-            </a:r>
-          </a:p>
-          <a:p>
-            <a:pPr marL="714346" indent="-714346">
-              <a:buAutoNum type="romanLcParenBoth"/>
-            </a:pPr>
-            <a:r>
-              <a:rPr lang="en-US" sz="3333" dirty="0">
-                <a:highlight>
-                  <a:srgbClr val="FFFF00"/>
-                </a:highlight>
-              </a:rPr>
-              <a:t>Table with performance of different methods under some accuracy measure.</a:t>
-            </a:r>
-          </a:p>
-          <a:p>
-            <a:pPr marL="714346" indent="-714346">
-              <a:buAutoNum type="romanLcParenBoth"/>
-            </a:pPr>
-            <a:r>
-              <a:rPr lang="en-US" sz="3333" dirty="0">
-                <a:highlight>
-                  <a:srgbClr val="FFFF00"/>
-                </a:highlight>
-              </a:rPr>
-              <a:t>Performance (qualitative or quantitative) of your methods under different parameter settings.)</a:t>
-            </a:r>
-          </a:p>
-          <a:p>
-            <a:pPr marL="714346" indent="-714346">
-              <a:buAutoNum type="romanLcParenBoth"/>
-            </a:pPr>
+              <a:rPr lang="en-US" sz="3333" dirty="0"/>
+              <a:t>The accuracy of each of the modules highly depends on a number of factors, also the performance of ANN is directly proportional to the quality of the segmented images.</a:t>
+            </a:r>
+          </a:p>
+          <a:p>
             <a:endParaRPr lang="en-US" sz="3333" dirty="0"/>
+          </a:p>
+          <a:p>
+            <a:r>
+              <a:rPr lang="en-US" sz="3333" dirty="0"/>
+              <a:t>The results generated from rigorous testing are as follows:</a:t>
+            </a:r>
+          </a:p>
+          <a:p>
+            <a:endParaRPr lang="en-US" sz="3333" dirty="0">
+              <a:highlight>
+                <a:srgbClr val="FFFF00"/>
+              </a:highlight>
+            </a:endParaRPr>
+          </a:p>
+          <a:p>
+            <a:endParaRPr lang="en-US" sz="3333" dirty="0">
+              <a:highlight>
+                <a:srgbClr val="FFFF00"/>
+              </a:highlight>
+            </a:endParaRPr>
+          </a:p>
+          <a:p>
+            <a:endParaRPr lang="en-US" sz="3333" dirty="0">
+              <a:highlight>
+                <a:srgbClr val="FFFF00"/>
+              </a:highlight>
+            </a:endParaRPr>
           </a:p>
         </p:txBody>
       </p:sp>
@@ -3472,17 +3401,41 @@
           <a:p>
             <a:r>
               <a:rPr lang="en-US" sz="3333" dirty="0"/>
-              <a:t>Improved OCR based Automatic Vehicle Number Plate Recognition using features trained Neural Network.</a:t>
+              <a:t>Bhavin V. </a:t>
+            </a:r>
+            <a:r>
+              <a:rPr lang="en-US" sz="3333" dirty="0" err="1"/>
+              <a:t>Kakani</a:t>
+            </a:r>
+            <a:r>
+              <a:rPr lang="en-US" sz="3333" dirty="0"/>
+              <a:t>, </a:t>
+            </a:r>
+            <a:r>
+              <a:rPr lang="en-US" sz="3333" dirty="0" err="1"/>
+              <a:t>Divyang</a:t>
+            </a:r>
+            <a:r>
+              <a:rPr lang="en-US" sz="3333" dirty="0"/>
+              <a:t> Gandhi, </a:t>
+            </a:r>
+            <a:r>
+              <a:rPr lang="en-US" sz="3333" dirty="0" err="1"/>
+              <a:t>Sagar</a:t>
+            </a:r>
+            <a:r>
+              <a:rPr lang="en-US" sz="3333" dirty="0"/>
+              <a:t> Jani, “Improved OCR based Automatic Vehicle Number Plate Recognition using features trained Neural Network.” IEEE-40222, ICCCNT  </a:t>
+            </a:r>
+          </a:p>
+          <a:p>
+            <a:r>
+              <a:rPr lang="en-US" sz="3333" dirty="0"/>
+              <a:t>2017</a:t>
             </a:r>
           </a:p>
           <a:p>
             <a:endParaRPr lang="en-US" sz="3333" dirty="0"/>
-          </a:p>
-          <a:p>
-            <a:r>
-              <a:rPr lang="en-US" sz="3333" dirty="0"/>
-              <a:t>https://ayearofai.com/rohan-lenny-1-neural-networks-the-backpropagation-algorithm-explained-abf4609d4f9d</a:t>
-            </a:r>
           </a:p>
         </p:txBody>
       </p:sp>
@@ -3571,6 +3524,221 @@
           </a:extLst>
         </p:spPr>
       </p:pic>
+      <p:pic>
+        <p:nvPicPr>
+          <p:cNvPr id="25" name="Picture 24">
+            <a:extLst>
+              <a:ext uri="{FF2B5EF4-FFF2-40B4-BE49-F238E27FC236}">
+                <a16:creationId xmlns:a16="http://schemas.microsoft.com/office/drawing/2014/main" id="{D3A2E648-8676-48D9-AAAF-3D7D81214561}"/>
+              </a:ext>
+            </a:extLst>
+          </p:cNvPr>
+          <p:cNvPicPr/>
+          <p:nvPr/>
+        </p:nvPicPr>
+        <p:blipFill>
+          <a:blip r:embed="rId5">
+            <a:extLst>
+              <a:ext uri="{28A0092B-C50C-407E-A947-70E740481C1C}">
+                <a14:useLocalDpi xmlns:a14="http://schemas.microsoft.com/office/drawing/2010/main" val="0"/>
+              </a:ext>
+            </a:extLst>
+          </a:blip>
+          <a:srcRect/>
+          <a:stretch>
+            <a:fillRect/>
+          </a:stretch>
+        </p:blipFill>
+        <p:spPr bwMode="auto">
+          <a:xfrm>
+            <a:off x="14156871" y="10956472"/>
+            <a:ext cx="6433457" cy="3673928"/>
+          </a:xfrm>
+          <a:prstGeom prst="rect">
+            <a:avLst/>
+          </a:prstGeom>
+          <a:noFill/>
+        </p:spPr>
+      </p:pic>
+      <p:graphicFrame>
+        <p:nvGraphicFramePr>
+          <p:cNvPr id="21" name="Table 20">
+            <a:extLst>
+              <a:ext uri="{FF2B5EF4-FFF2-40B4-BE49-F238E27FC236}">
+                <a16:creationId xmlns:a16="http://schemas.microsoft.com/office/drawing/2014/main" id="{23C1A6B1-615A-4355-85CE-6405737E0211}"/>
+              </a:ext>
+            </a:extLst>
+          </p:cNvPr>
+          <p:cNvGraphicFramePr>
+            <a:graphicFrameLocks noGrp="1"/>
+          </p:cNvGraphicFramePr>
+          <p:nvPr>
+            <p:extLst>
+              <p:ext uri="{D42A27DB-BD31-4B8C-83A1-F6EECF244321}">
+                <p14:modId xmlns:p14="http://schemas.microsoft.com/office/powerpoint/2010/main" val="1261386867"/>
+              </p:ext>
+            </p:extLst>
+          </p:nvPr>
+        </p:nvGraphicFramePr>
+        <p:xfrm>
+          <a:off x="10996863" y="20790568"/>
+          <a:ext cx="13018170" cy="5948857"/>
+        </p:xfrm>
+        <a:graphic>
+          <a:graphicData uri="http://schemas.openxmlformats.org/drawingml/2006/table">
+            <a:tbl>
+              <a:tblPr firstRow="1" bandRow="1">
+                <a:tableStyleId>{073A0DAA-6AF3-43AB-8588-CEC1D06C72B9}</a:tableStyleId>
+              </a:tblPr>
+              <a:tblGrid>
+                <a:gridCol w="6509085">
+                  <a:extLst>
+                    <a:ext uri="{9D8B030D-6E8A-4147-A177-3AD203B41FA5}">
+                      <a16:colId xmlns:a16="http://schemas.microsoft.com/office/drawing/2014/main" val="1215673138"/>
+                    </a:ext>
+                  </a:extLst>
+                </a:gridCol>
+                <a:gridCol w="6509085">
+                  <a:extLst>
+                    <a:ext uri="{9D8B030D-6E8A-4147-A177-3AD203B41FA5}">
+                      <a16:colId xmlns:a16="http://schemas.microsoft.com/office/drawing/2014/main" val="3673203329"/>
+                    </a:ext>
+                  </a:extLst>
+                </a:gridCol>
+              </a:tblGrid>
+              <a:tr h="1051818">
+                <a:tc>
+                  <a:txBody>
+                    <a:bodyPr/>
+                    <a:lstStyle/>
+                    <a:p>
+                      <a:endParaRPr lang="en-US" dirty="0"/>
+                    </a:p>
+                  </a:txBody>
+                  <a:tcPr/>
+                </a:tc>
+                <a:tc>
+                  <a:txBody>
+                    <a:bodyPr/>
+                    <a:lstStyle/>
+                    <a:p>
+                      <a:r>
+                        <a:rPr lang="en-US" sz="5000" dirty="0"/>
+                        <a:t>Accuracy</a:t>
+                      </a:r>
+                    </a:p>
+                  </a:txBody>
+                  <a:tcPr/>
+                </a:tc>
+                <a:extLst>
+                  <a:ext uri="{0D108BD9-81ED-4DB2-BD59-A6C34878D82A}">
+                    <a16:rowId xmlns:a16="http://schemas.microsoft.com/office/drawing/2014/main" val="1335674867"/>
+                  </a:ext>
+                </a:extLst>
+              </a:tr>
+              <a:tr h="1264883">
+                <a:tc>
+                  <a:txBody>
+                    <a:bodyPr/>
+                    <a:lstStyle/>
+                    <a:p>
+                      <a:r>
+                        <a:rPr lang="en-US" sz="5000" dirty="0"/>
+                        <a:t>Plate Localization</a:t>
+                      </a:r>
+                    </a:p>
+                  </a:txBody>
+                  <a:tcPr/>
+                </a:tc>
+                <a:tc>
+                  <a:txBody>
+                    <a:bodyPr/>
+                    <a:lstStyle/>
+                    <a:p>
+                      <a:r>
+                        <a:rPr lang="en-US" sz="5000" dirty="0"/>
+                        <a:t>78.9%</a:t>
+                      </a:r>
+                    </a:p>
+                  </a:txBody>
+                  <a:tcPr/>
+                </a:tc>
+                <a:extLst>
+                  <a:ext uri="{0D108BD9-81ED-4DB2-BD59-A6C34878D82A}">
+                    <a16:rowId xmlns:a16="http://schemas.microsoft.com/office/drawing/2014/main" val="75412831"/>
+                  </a:ext>
+                </a:extLst>
+              </a:tr>
+              <a:tr h="1420289">
+                <a:tc>
+                  <a:txBody>
+                    <a:bodyPr/>
+                    <a:lstStyle/>
+                    <a:p>
+                      <a:r>
+                        <a:rPr lang="en-US" sz="5000" dirty="0"/>
+                        <a:t>Character Segmentation</a:t>
+                      </a:r>
+                    </a:p>
+                  </a:txBody>
+                  <a:tcPr/>
+                </a:tc>
+                <a:tc>
+                  <a:txBody>
+                    <a:bodyPr/>
+                    <a:lstStyle/>
+                    <a:p>
+                      <a:r>
+                        <a:rPr lang="en-US" sz="5000" dirty="0"/>
+                        <a:t>60%</a:t>
+                      </a:r>
+                    </a:p>
+                  </a:txBody>
+                  <a:tcPr/>
+                </a:tc>
+                <a:extLst>
+                  <a:ext uri="{0D108BD9-81ED-4DB2-BD59-A6C34878D82A}">
+                    <a16:rowId xmlns:a16="http://schemas.microsoft.com/office/drawing/2014/main" val="1065037943"/>
+                  </a:ext>
+                </a:extLst>
+              </a:tr>
+              <a:tr h="1872194">
+                <a:tc>
+                  <a:txBody>
+                    <a:bodyPr/>
+                    <a:lstStyle/>
+                    <a:p>
+                      <a:r>
+                        <a:rPr lang="en-US" sz="5000" dirty="0"/>
+                        <a:t>OCR from the segmented characters</a:t>
+                      </a:r>
+                    </a:p>
+                  </a:txBody>
+                  <a:tcPr/>
+                </a:tc>
+                <a:tc>
+                  <a:txBody>
+                    <a:bodyPr/>
+                    <a:lstStyle/>
+                    <a:p>
+                      <a:r>
+                        <a:rPr lang="en-US" sz="5000" dirty="0"/>
+                        <a:t>55.66%</a:t>
+                      </a:r>
+                    </a:p>
+                  </a:txBody>
+                  <a:tcPr/>
+                </a:tc>
+                <a:extLst>
+                  <a:ext uri="{0D108BD9-81ED-4DB2-BD59-A6C34878D82A}">
+                    <a16:rowId xmlns:a16="http://schemas.microsoft.com/office/drawing/2014/main" val="3390015381"/>
+                  </a:ext>
+                </a:extLst>
+              </a:tr>
+            </a:tbl>
+          </a:graphicData>
+        </a:graphic>
+      </p:graphicFrame>
     </p:spTree>
     <p:extLst>
       <p:ext uri="{BB962C8B-B14F-4D97-AF65-F5344CB8AC3E}">

</xml_diff>